<commit_message>
continue to flush out content in the deck, addd the Visio doc for the reference architecture, including a static PNG for reference
</commit_message>
<xml_diff>
--- a/Massive scale with Azure Event Hubs for IoT.pptx
+++ b/Massive scale with Azure Event Hubs for IoT.pptx
@@ -116,6 +116,11 @@
       </a:defRPr>
     </a:lvl9pPr>
   </p:defaultTextStyle>
+  <p:extLst>
+    <p:ext uri="{EFAFB233-063F-42B5-8137-9DF3F51BA10A}">
+      <p15:sldGuideLst xmlns:p15="http://schemas.microsoft.com/office/powerpoint/2012/main"/>
+    </p:ext>
+  </p:extLst>
 </p:presentation>
 </file>
 
@@ -250,7 +255,7 @@
           <a:p>
             <a:fld id="{0413ECA0-4B78-4FFD-999A-A768F8F5B9FB}" type="datetimeFigureOut">
               <a:rPr lang="en-US" smtClean="0"/>
-              <a:t>11/9/2015</a:t>
+              <a:t>11/10/2015</a:t>
             </a:fld>
             <a:endParaRPr lang="en-US"/>
           </a:p>
@@ -420,7 +425,7 @@
           <a:p>
             <a:fld id="{0413ECA0-4B78-4FFD-999A-A768F8F5B9FB}" type="datetimeFigureOut">
               <a:rPr lang="en-US" smtClean="0"/>
-              <a:t>11/9/2015</a:t>
+              <a:t>11/10/2015</a:t>
             </a:fld>
             <a:endParaRPr lang="en-US"/>
           </a:p>
@@ -600,7 +605,7 @@
           <a:p>
             <a:fld id="{0413ECA0-4B78-4FFD-999A-A768F8F5B9FB}" type="datetimeFigureOut">
               <a:rPr lang="en-US" smtClean="0"/>
-              <a:t>11/9/2015</a:t>
+              <a:t>11/10/2015</a:t>
             </a:fld>
             <a:endParaRPr lang="en-US"/>
           </a:p>
@@ -770,7 +775,7 @@
           <a:p>
             <a:fld id="{0413ECA0-4B78-4FFD-999A-A768F8F5B9FB}" type="datetimeFigureOut">
               <a:rPr lang="en-US" smtClean="0"/>
-              <a:t>11/9/2015</a:t>
+              <a:t>11/10/2015</a:t>
             </a:fld>
             <a:endParaRPr lang="en-US"/>
           </a:p>
@@ -1016,7 +1021,7 @@
           <a:p>
             <a:fld id="{0413ECA0-4B78-4FFD-999A-A768F8F5B9FB}" type="datetimeFigureOut">
               <a:rPr lang="en-US" smtClean="0"/>
-              <a:t>11/9/2015</a:t>
+              <a:t>11/10/2015</a:t>
             </a:fld>
             <a:endParaRPr lang="en-US"/>
           </a:p>
@@ -1248,7 +1253,7 @@
           <a:p>
             <a:fld id="{0413ECA0-4B78-4FFD-999A-A768F8F5B9FB}" type="datetimeFigureOut">
               <a:rPr lang="en-US" smtClean="0"/>
-              <a:t>11/9/2015</a:t>
+              <a:t>11/10/2015</a:t>
             </a:fld>
             <a:endParaRPr lang="en-US"/>
           </a:p>
@@ -1615,7 +1620,7 @@
           <a:p>
             <a:fld id="{0413ECA0-4B78-4FFD-999A-A768F8F5B9FB}" type="datetimeFigureOut">
               <a:rPr lang="en-US" smtClean="0"/>
-              <a:t>11/9/2015</a:t>
+              <a:t>11/10/2015</a:t>
             </a:fld>
             <a:endParaRPr lang="en-US"/>
           </a:p>
@@ -1733,7 +1738,7 @@
           <a:p>
             <a:fld id="{0413ECA0-4B78-4FFD-999A-A768F8F5B9FB}" type="datetimeFigureOut">
               <a:rPr lang="en-US" smtClean="0"/>
-              <a:t>11/9/2015</a:t>
+              <a:t>11/10/2015</a:t>
             </a:fld>
             <a:endParaRPr lang="en-US"/>
           </a:p>
@@ -1828,7 +1833,7 @@
           <a:p>
             <a:fld id="{0413ECA0-4B78-4FFD-999A-A768F8F5B9FB}" type="datetimeFigureOut">
               <a:rPr lang="en-US" smtClean="0"/>
-              <a:t>11/9/2015</a:t>
+              <a:t>11/10/2015</a:t>
             </a:fld>
             <a:endParaRPr lang="en-US"/>
           </a:p>
@@ -2105,7 +2110,7 @@
           <a:p>
             <a:fld id="{0413ECA0-4B78-4FFD-999A-A768F8F5B9FB}" type="datetimeFigureOut">
               <a:rPr lang="en-US" smtClean="0"/>
-              <a:t>11/9/2015</a:t>
+              <a:t>11/10/2015</a:t>
             </a:fld>
             <a:endParaRPr lang="en-US"/>
           </a:p>
@@ -2358,7 +2363,7 @@
           <a:p>
             <a:fld id="{0413ECA0-4B78-4FFD-999A-A768F8F5B9FB}" type="datetimeFigureOut">
               <a:rPr lang="en-US" smtClean="0"/>
-              <a:t>11/9/2015</a:t>
+              <a:t>11/10/2015</a:t>
             </a:fld>
             <a:endParaRPr lang="en-US"/>
           </a:p>
@@ -2571,7 +2576,7 @@
           <a:p>
             <a:fld id="{0413ECA0-4B78-4FFD-999A-A768F8F5B9FB}" type="datetimeFigureOut">
               <a:rPr lang="en-US" smtClean="0"/>
-              <a:t>11/9/2015</a:t>
+              <a:t>11/10/2015</a:t>
             </a:fld>
             <a:endParaRPr lang="en-US"/>
           </a:p>
@@ -3013,10 +3018,15 @@
             <p:ph type="subTitle" idx="1"/>
           </p:nvPr>
         </p:nvSpPr>
-        <p:spPr/>
+        <p:spPr>
+          <a:xfrm>
+            <a:off x="1524000" y="3602038"/>
+            <a:ext cx="9144000" cy="2798762"/>
+          </a:xfrm>
+        </p:spPr>
         <p:txBody>
           <a:bodyPr>
-            <a:normAutofit lnSpcReduction="10000"/>
+            <a:normAutofit fontScale="92500" lnSpcReduction="10000"/>
           </a:bodyPr>
           <a:lstStyle/>
           <a:p>
@@ -3036,8 +3046,38 @@
           </a:p>
           <a:p>
             <a:r>
-              <a:rPr lang="en-US" dirty="0" smtClean="0"/>
-              <a:t>http://robchartier.io</a:t>
+              <a:rPr lang="en-US" dirty="0" smtClean="0">
+                <a:hlinkClick r:id="rId2"/>
+              </a:rPr>
+              <a:t>http://</a:t>
+            </a:r>
+            <a:r>
+              <a:rPr lang="en-US" dirty="0" smtClean="0">
+                <a:hlinkClick r:id="rId2"/>
+              </a:rPr>
+              <a:t>robchartier.io</a:t>
+            </a:r>
+            <a:endParaRPr lang="en-US" dirty="0" smtClean="0"/>
+          </a:p>
+          <a:p>
+            <a:endParaRPr lang="en-US" dirty="0"/>
+          </a:p>
+          <a:p>
+            <a:r>
+              <a:rPr lang="en-US" dirty="0" smtClean="0"/>
+              <a:t>Content</a:t>
+            </a:r>
+            <a:r>
+              <a:rPr lang="en-US" dirty="0" smtClean="0"/>
+              <a:t>:</a:t>
+            </a:r>
+          </a:p>
+          <a:p>
+            <a:r>
+              <a:rPr lang="en-US" dirty="0">
+                <a:hlinkClick r:id="rId3"/>
+              </a:rPr>
+              <a:t>https://goo.gl/II1vh4</a:t>
             </a:r>
             <a:endParaRPr lang="en-US" dirty="0"/>
           </a:p>
@@ -3397,6 +3437,37 @@
           <a:bodyPr/>
           <a:lstStyle/>
           <a:p>
+            <a:r>
+              <a:rPr lang="en-US" dirty="0" smtClean="0"/>
+              <a:t>Make sure you optimize the Hot path.  </a:t>
+            </a:r>
+          </a:p>
+          <a:p>
+            <a:endParaRPr lang="en-US" dirty="0" smtClean="0"/>
+          </a:p>
+          <a:p>
+            <a:r>
+              <a:rPr lang="en-US" dirty="0" smtClean="0"/>
+              <a:t>Focus on what is important between the device and the consumer</a:t>
+            </a:r>
+          </a:p>
+          <a:p>
+            <a:endParaRPr lang="en-US" dirty="0" smtClean="0"/>
+          </a:p>
+          <a:p>
+            <a:r>
+              <a:rPr lang="en-US" dirty="0" smtClean="0"/>
+              <a:t>Use streaming analytics for persistence</a:t>
+            </a:r>
+          </a:p>
+          <a:p>
+            <a:endParaRPr lang="en-US" dirty="0"/>
+          </a:p>
+          <a:p>
+            <a:r>
+              <a:rPr lang="en-US" dirty="0" smtClean="0"/>
+              <a:t>Its better to NOT use any of your custom worker roles in the Hot Path, minimize it as much as you can.</a:t>
+            </a:r>
             <a:endParaRPr lang="en-US" dirty="0"/>
           </a:p>
         </p:txBody>

</xml_diff>

<commit_message>
further tweaking around partition keys and representing data.  added more content to pptx
</commit_message>
<xml_diff>
--- a/Massive scale with Azure Event Hubs for IoT.pptx
+++ b/Massive scale with Azure Event Hubs for IoT.pptx
@@ -14,10 +14,13 @@
     <p:sldId id="266" r:id="rId8"/>
     <p:sldId id="267" r:id="rId9"/>
     <p:sldId id="261" r:id="rId10"/>
-    <p:sldId id="270" r:id="rId11"/>
-    <p:sldId id="262" r:id="rId12"/>
-    <p:sldId id="269" r:id="rId13"/>
-    <p:sldId id="271" r:id="rId14"/>
+    <p:sldId id="275" r:id="rId11"/>
+    <p:sldId id="274" r:id="rId12"/>
+    <p:sldId id="270" r:id="rId13"/>
+    <p:sldId id="262" r:id="rId14"/>
+    <p:sldId id="269" r:id="rId15"/>
+    <p:sldId id="271" r:id="rId16"/>
+    <p:sldId id="272" r:id="rId17"/>
   </p:sldIdLst>
   <p:sldSz cx="12192000" cy="6858000"/>
   <p:notesSz cx="6858000" cy="9144000"/>
@@ -3137,7 +3140,7 @@
           <a:p>
             <a:r>
               <a:rPr lang="en-US" dirty="0" smtClean="0"/>
-              <a:t>Event Hub – Setting up to receive messages</a:t>
+              <a:t>Checkpoint Strategies</a:t>
             </a:r>
             <a:endParaRPr lang="en-US" dirty="0"/>
           </a:p>
@@ -3160,49 +3163,86 @@
           </a:bodyPr>
           <a:lstStyle/>
           <a:p>
-            <a:r>
-              <a:rPr lang="en-US" dirty="0" smtClean="0"/>
-              <a:t>Need to create a Storage account for the client to manage Leases on our partitions</a:t>
-            </a:r>
-          </a:p>
-          <a:p>
-            <a:r>
-              <a:rPr lang="en-US" dirty="0" smtClean="0"/>
-              <a:t>The </a:t>
-            </a:r>
-            <a:r>
-              <a:rPr lang="en-US" dirty="0" err="1" smtClean="0"/>
-              <a:t>EventHubProcessorHost</a:t>
-            </a:r>
-            <a:r>
-              <a:rPr lang="en-US" dirty="0" smtClean="0"/>
-              <a:t> is a high level abstraction above a basic Event Hub Consumer.  </a:t>
-            </a:r>
-          </a:p>
-          <a:p>
-            <a:pPr lvl="1"/>
-            <a:r>
-              <a:rPr lang="en-US" dirty="0" smtClean="0"/>
-              <a:t>It automatically manages which consumer (worker role) is connected to each partition on the Event Hub</a:t>
-            </a:r>
-          </a:p>
-          <a:p>
-            <a:pPr lvl="1"/>
+            <a:pPr marL="514350" indent="-514350">
+              <a:buFont typeface="+mj-lt"/>
+              <a:buAutoNum type="arabicPeriod"/>
+            </a:pPr>
+            <a:r>
+              <a:rPr lang="en-US" dirty="0" smtClean="0"/>
+              <a:t>Time duration where it is acceptable to replay events within that duration  (the last X minutes)</a:t>
+            </a:r>
+          </a:p>
+          <a:p>
+            <a:pPr marL="514350" indent="-514350">
+              <a:buFont typeface="+mj-lt"/>
+              <a:buAutoNum type="arabicPeriod"/>
+            </a:pPr>
             <a:endParaRPr lang="en-US" dirty="0" smtClean="0"/>
           </a:p>
           <a:p>
-            <a:pPr lvl="1"/>
-            <a:r>
-              <a:rPr lang="en-US" dirty="0" smtClean="0"/>
-              <a:t>It is needed in order to guarantee a single consumer per partition in our Event Hub</a:t>
-            </a:r>
+            <a:pPr marL="514350" indent="-514350">
+              <a:buFont typeface="+mj-lt"/>
+              <a:buAutoNum type="arabicPeriod"/>
+            </a:pPr>
+            <a:r>
+              <a:rPr lang="en-US" dirty="0" smtClean="0"/>
+              <a:t>Messag</a:t>
+            </a:r>
+            <a:r>
+              <a:rPr lang="en-US" dirty="0" smtClean="0"/>
+              <a:t>e count where it is acceptable to replay events within that count (the last N messages)</a:t>
+            </a:r>
+          </a:p>
+          <a:p>
+            <a:pPr marL="514350" indent="-514350">
+              <a:buFont typeface="+mj-lt"/>
+              <a:buAutoNum type="arabicPeriod"/>
+            </a:pPr>
+            <a:endParaRPr lang="en-US" dirty="0"/>
+          </a:p>
+          <a:p>
+            <a:pPr marL="514350" indent="-514350">
+              <a:buFont typeface="+mj-lt"/>
+              <a:buAutoNum type="arabicPeriod"/>
+            </a:pPr>
+            <a:r>
+              <a:rPr lang="en-US" dirty="0" smtClean="0"/>
+              <a:t>Every time</a:t>
+            </a:r>
+          </a:p>
+          <a:p>
+            <a:pPr marL="971550" lvl="1" indent="-514350">
+              <a:buFont typeface="+mj-lt"/>
+              <a:buAutoNum type="arabicPeriod"/>
+            </a:pPr>
+            <a:r>
+              <a:rPr lang="en-US" dirty="0" smtClean="0"/>
+              <a:t>Generally considered a bad idea</a:t>
+            </a:r>
+          </a:p>
+          <a:p>
+            <a:pPr marL="971550" lvl="1" indent="-514350">
+              <a:buFont typeface="+mj-lt"/>
+              <a:buAutoNum type="arabicPeriod"/>
+            </a:pPr>
+            <a:r>
+              <a:rPr lang="en-US" dirty="0" smtClean="0"/>
+              <a:t>It is resource intensive</a:t>
+            </a:r>
+          </a:p>
+          <a:p>
+            <a:pPr marL="514350" indent="-514350">
+              <a:buFont typeface="+mj-lt"/>
+              <a:buAutoNum type="arabicPeriod"/>
+            </a:pPr>
+            <a:endParaRPr lang="en-US" dirty="0"/>
           </a:p>
         </p:txBody>
       </p:sp>
     </p:spTree>
     <p:extLst>
       <p:ext uri="{BB962C8B-B14F-4D97-AF65-F5344CB8AC3E}">
-        <p14:creationId xmlns:p14="http://schemas.microsoft.com/office/powerpoint/2010/main" val="4010707021"/>
+        <p14:creationId xmlns:p14="http://schemas.microsoft.com/office/powerpoint/2010/main" val="210202634"/>
       </p:ext>
     </p:extLst>
   </p:cSld>
@@ -3253,6 +3293,201 @@
           <a:p>
             <a:r>
               <a:rPr lang="en-US" dirty="0" smtClean="0"/>
+              <a:t>Event Hub – Sending Demo</a:t>
+            </a:r>
+            <a:endParaRPr lang="en-US" dirty="0"/>
+          </a:p>
+        </p:txBody>
+      </p:sp>
+      <p:sp>
+        <p:nvSpPr>
+          <p:cNvPr id="3" name="Content Placeholder 2"/>
+          <p:cNvSpPr>
+            <a:spLocks noGrp="1"/>
+          </p:cNvSpPr>
+          <p:nvPr>
+            <p:ph idx="1"/>
+          </p:nvPr>
+        </p:nvSpPr>
+        <p:spPr/>
+        <p:txBody>
+          <a:bodyPr/>
+          <a:lstStyle/>
+          <a:p>
+            <a:endParaRPr lang="en-US"/>
+          </a:p>
+        </p:txBody>
+      </p:sp>
+    </p:spTree>
+    <p:extLst>
+      <p:ext uri="{BB962C8B-B14F-4D97-AF65-F5344CB8AC3E}">
+        <p14:creationId xmlns:p14="http://schemas.microsoft.com/office/powerpoint/2010/main" val="3584752711"/>
+      </p:ext>
+    </p:extLst>
+  </p:cSld>
+  <p:clrMapOvr>
+    <a:masterClrMapping/>
+  </p:clrMapOvr>
+  <p:timing>
+    <p:tnLst>
+      <p:par>
+        <p:cTn id="1" dur="indefinite" restart="never" nodeType="tmRoot"/>
+      </p:par>
+    </p:tnLst>
+  </p:timing>
+</p:sld>
+</file>
+
+<file path=ppt/slides/slide12.xml><?xml version="1.0" encoding="utf-8"?>
+<p:sld xmlns:a="http://schemas.openxmlformats.org/drawingml/2006/main" xmlns:r="http://schemas.openxmlformats.org/officeDocument/2006/relationships" xmlns:p="http://schemas.openxmlformats.org/presentationml/2006/main">
+  <p:cSld>
+    <p:spTree>
+      <p:nvGrpSpPr>
+        <p:cNvPr id="1" name=""/>
+        <p:cNvGrpSpPr/>
+        <p:nvPr/>
+      </p:nvGrpSpPr>
+      <p:grpSpPr>
+        <a:xfrm>
+          <a:off x="0" y="0"/>
+          <a:ext cx="0" cy="0"/>
+          <a:chOff x="0" y="0"/>
+          <a:chExt cx="0" cy="0"/>
+        </a:xfrm>
+      </p:grpSpPr>
+      <p:sp>
+        <p:nvSpPr>
+          <p:cNvPr id="2" name="Title 1"/>
+          <p:cNvSpPr>
+            <a:spLocks noGrp="1"/>
+          </p:cNvSpPr>
+          <p:nvPr>
+            <p:ph type="title"/>
+          </p:nvPr>
+        </p:nvSpPr>
+        <p:spPr/>
+        <p:txBody>
+          <a:bodyPr/>
+          <a:lstStyle/>
+          <a:p>
+            <a:r>
+              <a:rPr lang="en-US" dirty="0" smtClean="0"/>
+              <a:t>Event Hub – Setting up to receive messages</a:t>
+            </a:r>
+            <a:endParaRPr lang="en-US" dirty="0"/>
+          </a:p>
+        </p:txBody>
+      </p:sp>
+      <p:sp>
+        <p:nvSpPr>
+          <p:cNvPr id="3" name="Content Placeholder 2"/>
+          <p:cNvSpPr>
+            <a:spLocks noGrp="1"/>
+          </p:cNvSpPr>
+          <p:nvPr>
+            <p:ph idx="1"/>
+          </p:nvPr>
+        </p:nvSpPr>
+        <p:spPr/>
+        <p:txBody>
+          <a:bodyPr>
+            <a:normAutofit/>
+          </a:bodyPr>
+          <a:lstStyle/>
+          <a:p>
+            <a:r>
+              <a:rPr lang="en-US" dirty="0" smtClean="0"/>
+              <a:t>Need to create a Storage account for the client to manage Leases on our partitions</a:t>
+            </a:r>
+          </a:p>
+          <a:p>
+            <a:r>
+              <a:rPr lang="en-US" dirty="0" smtClean="0"/>
+              <a:t>The </a:t>
+            </a:r>
+            <a:r>
+              <a:rPr lang="en-US" dirty="0" err="1" smtClean="0"/>
+              <a:t>EventHubProcessorHost</a:t>
+            </a:r>
+            <a:r>
+              <a:rPr lang="en-US" dirty="0" smtClean="0"/>
+              <a:t> is a high level abstraction above a basic Event Hub Consumer.  </a:t>
+            </a:r>
+          </a:p>
+          <a:p>
+            <a:pPr lvl="1"/>
+            <a:r>
+              <a:rPr lang="en-US" dirty="0" smtClean="0"/>
+              <a:t>It automatically manages which consumer (worker role) is connected to each partition on the Event Hub</a:t>
+            </a:r>
+          </a:p>
+          <a:p>
+            <a:pPr lvl="1"/>
+            <a:endParaRPr lang="en-US" dirty="0" smtClean="0"/>
+          </a:p>
+          <a:p>
+            <a:pPr lvl="1"/>
+            <a:r>
+              <a:rPr lang="en-US" dirty="0" smtClean="0"/>
+              <a:t>It is needed in order to guarantee a single consumer per partition in our Event Hub</a:t>
+            </a:r>
+          </a:p>
+        </p:txBody>
+      </p:sp>
+    </p:spTree>
+    <p:extLst>
+      <p:ext uri="{BB962C8B-B14F-4D97-AF65-F5344CB8AC3E}">
+        <p14:creationId xmlns:p14="http://schemas.microsoft.com/office/powerpoint/2010/main" val="4010707021"/>
+      </p:ext>
+    </p:extLst>
+  </p:cSld>
+  <p:clrMapOvr>
+    <a:masterClrMapping/>
+  </p:clrMapOvr>
+  <p:timing>
+    <p:tnLst>
+      <p:par>
+        <p:cTn id="1" dur="indefinite" restart="never" nodeType="tmRoot"/>
+      </p:par>
+    </p:tnLst>
+  </p:timing>
+</p:sld>
+</file>
+
+<file path=ppt/slides/slide13.xml><?xml version="1.0" encoding="utf-8"?>
+<p:sld xmlns:a="http://schemas.openxmlformats.org/drawingml/2006/main" xmlns:r="http://schemas.openxmlformats.org/officeDocument/2006/relationships" xmlns:p="http://schemas.openxmlformats.org/presentationml/2006/main">
+  <p:cSld>
+    <p:spTree>
+      <p:nvGrpSpPr>
+        <p:cNvPr id="1" name=""/>
+        <p:cNvGrpSpPr/>
+        <p:nvPr/>
+      </p:nvGrpSpPr>
+      <p:grpSpPr>
+        <a:xfrm>
+          <a:off x="0" y="0"/>
+          <a:ext cx="0" cy="0"/>
+          <a:chOff x="0" y="0"/>
+          <a:chExt cx="0" cy="0"/>
+        </a:xfrm>
+      </p:grpSpPr>
+      <p:sp>
+        <p:nvSpPr>
+          <p:cNvPr id="2" name="Title 1"/>
+          <p:cNvSpPr>
+            <a:spLocks noGrp="1"/>
+          </p:cNvSpPr>
+          <p:nvPr>
+            <p:ph type="title"/>
+          </p:nvPr>
+        </p:nvSpPr>
+        <p:spPr/>
+        <p:txBody>
+          <a:bodyPr/>
+          <a:lstStyle/>
+          <a:p>
+            <a:r>
+              <a:rPr lang="en-US" dirty="0" smtClean="0"/>
               <a:t>Event Hub – Receiving Demo</a:t>
             </a:r>
             <a:endParaRPr lang="en-US" dirty="0"/>
@@ -3274,7 +3509,29 @@
           <a:bodyPr/>
           <a:lstStyle/>
           <a:p>
-            <a:endParaRPr lang="en-US"/>
+            <a:r>
+              <a:rPr lang="en-US" dirty="0" smtClean="0"/>
+              <a:t>Basic - consuming events</a:t>
+            </a:r>
+          </a:p>
+          <a:p>
+            <a:r>
+              <a:rPr lang="en-US" dirty="0" smtClean="0"/>
+              <a:t>Far better – consuming events with partitioning</a:t>
+            </a:r>
+          </a:p>
+          <a:p>
+            <a:r>
+              <a:rPr lang="en-US" dirty="0" smtClean="0"/>
+              <a:t>Bad – consuming </a:t>
+            </a:r>
+            <a:r>
+              <a:rPr lang="en-US" smtClean="0"/>
+              <a:t>events improperly</a:t>
+            </a:r>
+          </a:p>
+          <a:p>
+            <a:endParaRPr lang="en-US" dirty="0" smtClean="0"/>
           </a:p>
         </p:txBody>
       </p:sp>
@@ -3298,7 +3555,7 @@
 </p:sld>
 </file>
 
-<file path=ppt/slides/slide12.xml><?xml version="1.0" encoding="utf-8"?>
+<file path=ppt/slides/slide14.xml><?xml version="1.0" encoding="utf-8"?>
 <p:sld xmlns:a="http://schemas.openxmlformats.org/drawingml/2006/main" xmlns:r="http://schemas.openxmlformats.org/officeDocument/2006/relationships" xmlns:p="http://schemas.openxmlformats.org/presentationml/2006/main">
   <p:cSld>
     <p:spTree>
@@ -3382,7 +3639,7 @@
 </p:sld>
 </file>
 
-<file path=ppt/slides/slide13.xml><?xml version="1.0" encoding="utf-8"?>
+<file path=ppt/slides/slide15.xml><?xml version="1.0" encoding="utf-8"?>
 <p:sld xmlns:a="http://schemas.openxmlformats.org/drawingml/2006/main" xmlns:r="http://schemas.openxmlformats.org/officeDocument/2006/relationships" xmlns:p="http://schemas.openxmlformats.org/presentationml/2006/main">
   <p:cSld>
     <p:spTree>
@@ -3489,6 +3746,239 @@
       </p:par>
     </p:tnLst>
   </p:timing>
+</p:sld>
+</file>
+
+<file path=ppt/slides/slide16.xml><?xml version="1.0" encoding="utf-8"?>
+<p:sld xmlns:a="http://schemas.openxmlformats.org/drawingml/2006/main" xmlns:r="http://schemas.openxmlformats.org/officeDocument/2006/relationships" xmlns:p="http://schemas.openxmlformats.org/presentationml/2006/main">
+  <p:cSld>
+    <p:spTree>
+      <p:nvGrpSpPr>
+        <p:cNvPr id="1" name=""/>
+        <p:cNvGrpSpPr/>
+        <p:nvPr/>
+      </p:nvGrpSpPr>
+      <p:grpSpPr>
+        <a:xfrm>
+          <a:off x="0" y="0"/>
+          <a:ext cx="0" cy="0"/>
+          <a:chOff x="0" y="0"/>
+          <a:chExt cx="0" cy="0"/>
+        </a:xfrm>
+      </p:grpSpPr>
+      <p:sp>
+        <p:nvSpPr>
+          <p:cNvPr id="2" name="Title 1"/>
+          <p:cNvSpPr>
+            <a:spLocks noGrp="1"/>
+          </p:cNvSpPr>
+          <p:nvPr>
+            <p:ph type="title"/>
+          </p:nvPr>
+        </p:nvSpPr>
+        <p:spPr/>
+        <p:txBody>
+          <a:bodyPr/>
+          <a:lstStyle/>
+          <a:p>
+            <a:r>
+              <a:rPr lang="en-US" dirty="0" smtClean="0"/>
+              <a:t>Resources</a:t>
+            </a:r>
+            <a:endParaRPr lang="en-US" dirty="0"/>
+          </a:p>
+        </p:txBody>
+      </p:sp>
+      <p:sp>
+        <p:nvSpPr>
+          <p:cNvPr id="3" name="Content Placeholder 2"/>
+          <p:cNvSpPr>
+            <a:spLocks noGrp="1"/>
+          </p:cNvSpPr>
+          <p:nvPr>
+            <p:ph idx="1"/>
+          </p:nvPr>
+        </p:nvSpPr>
+        <p:spPr/>
+        <p:txBody>
+          <a:bodyPr>
+            <a:normAutofit fontScale="77500" lnSpcReduction="20000"/>
+          </a:bodyPr>
+          <a:lstStyle/>
+          <a:p>
+            <a:r>
+              <a:rPr lang="en-US" dirty="0" smtClean="0"/>
+              <a:t>Check the “Tools” folder in the GitHub Repo</a:t>
+            </a:r>
+          </a:p>
+          <a:p>
+            <a:r>
+              <a:rPr lang="en-US" dirty="0" smtClean="0"/>
+              <a:t>GitHub Repo for this presentation: </a:t>
+            </a:r>
+            <a:r>
+              <a:rPr lang="en-US" dirty="0">
+                <a:hlinkClick r:id="rId2"/>
+              </a:rPr>
+              <a:t>https://goo.gl/II1vh4</a:t>
+            </a:r>
+            <a:endParaRPr lang="en-US" dirty="0"/>
+          </a:p>
+          <a:p>
+            <a:r>
+              <a:rPr lang="en-US" dirty="0"/>
+              <a:t>Azure Event Hubs overview</a:t>
+            </a:r>
+          </a:p>
+          <a:p>
+            <a:pPr lvl="1"/>
+            <a:r>
+              <a:rPr lang="en-US" dirty="0" smtClean="0">
+                <a:hlinkClick r:id="rId3"/>
+              </a:rPr>
+              <a:t>https</a:t>
+            </a:r>
+            <a:r>
+              <a:rPr lang="en-US" dirty="0">
+                <a:hlinkClick r:id="rId3"/>
+              </a:rPr>
+              <a:t>://azure.microsoft.com/en-us/documentation/articles/event-hubs-overview</a:t>
+            </a:r>
+            <a:r>
+              <a:rPr lang="en-US" dirty="0" smtClean="0">
+                <a:hlinkClick r:id="rId3"/>
+              </a:rPr>
+              <a:t>/</a:t>
+            </a:r>
+            <a:endParaRPr lang="en-US" dirty="0" smtClean="0"/>
+          </a:p>
+          <a:p>
+            <a:r>
+              <a:rPr lang="en-US" dirty="0"/>
+              <a:t>Get started with Event Hubs</a:t>
+            </a:r>
+          </a:p>
+          <a:p>
+            <a:pPr lvl="1"/>
+            <a:r>
+              <a:rPr lang="en-US" dirty="0" smtClean="0">
+                <a:hlinkClick r:id="rId4"/>
+              </a:rPr>
+              <a:t>https</a:t>
+            </a:r>
+            <a:r>
+              <a:rPr lang="en-US" dirty="0">
+                <a:hlinkClick r:id="rId4"/>
+              </a:rPr>
+              <a:t>://azure.microsoft.com/en-us/documentation/articles/event-hubs-csharp-ephcs-getstarted</a:t>
+            </a:r>
+            <a:r>
+              <a:rPr lang="en-US" dirty="0" smtClean="0">
+                <a:hlinkClick r:id="rId4"/>
+              </a:rPr>
+              <a:t>/</a:t>
+            </a:r>
+            <a:endParaRPr lang="en-US" dirty="0" smtClean="0"/>
+          </a:p>
+          <a:p>
+            <a:r>
+              <a:rPr lang="en-US" dirty="0"/>
+              <a:t>Event Hubs Signature Generator </a:t>
+            </a:r>
+            <a:r>
+              <a:rPr lang="en-US" dirty="0" smtClean="0"/>
+              <a:t>0.2.0.1</a:t>
+            </a:r>
+          </a:p>
+          <a:p>
+            <a:pPr lvl="1"/>
+            <a:r>
+              <a:rPr lang="en-US" dirty="0">
+                <a:hlinkClick r:id="rId5"/>
+              </a:rPr>
+              <a:t>https://</a:t>
+            </a:r>
+            <a:r>
+              <a:rPr lang="en-US" dirty="0" smtClean="0">
+                <a:hlinkClick r:id="rId5"/>
+              </a:rPr>
+              <a:t>github.com/sandrinodimattia/RedDog/releases/tag/0.2.0.1</a:t>
+            </a:r>
+            <a:endParaRPr lang="en-US" dirty="0" smtClean="0"/>
+          </a:p>
+          <a:p>
+            <a:r>
+              <a:rPr lang="en-US" dirty="0"/>
+              <a:t>Send Data into Azure Event Hubs using Web </a:t>
+            </a:r>
+            <a:r>
+              <a:rPr lang="en-US" dirty="0" err="1"/>
+              <a:t>Api’s</a:t>
+            </a:r>
+            <a:r>
+              <a:rPr lang="en-US" dirty="0"/>
+              <a:t> </a:t>
+            </a:r>
+            <a:r>
+              <a:rPr lang="en-US" dirty="0" err="1" smtClean="0"/>
+              <a:t>HttpClient</a:t>
+            </a:r>
+            <a:endParaRPr lang="en-US" dirty="0" smtClean="0"/>
+          </a:p>
+          <a:p>
+            <a:pPr lvl="1"/>
+            <a:r>
+              <a:rPr lang="en-US" dirty="0">
+                <a:hlinkClick r:id="rId6"/>
+              </a:rPr>
+              <a:t>https://blogs.endjin.com/2015/02/send-data-into-azure-event-hubs-using-web-apis-httpclient</a:t>
+            </a:r>
+            <a:r>
+              <a:rPr lang="en-US" dirty="0" smtClean="0">
+                <a:hlinkClick r:id="rId6"/>
+              </a:rPr>
+              <a:t>/</a:t>
+            </a:r>
+            <a:endParaRPr lang="en-US" dirty="0" smtClean="0"/>
+          </a:p>
+          <a:p>
+            <a:r>
+              <a:rPr lang="en-US" dirty="0"/>
+              <a:t>Service Bus </a:t>
+            </a:r>
+            <a:r>
+              <a:rPr lang="en-US" dirty="0" smtClean="0"/>
+              <a:t>Explorer</a:t>
+            </a:r>
+          </a:p>
+          <a:p>
+            <a:pPr lvl="1"/>
+            <a:r>
+              <a:rPr lang="en-US" dirty="0">
+                <a:hlinkClick r:id="rId7"/>
+              </a:rPr>
+              <a:t>http://</a:t>
+            </a:r>
+            <a:r>
+              <a:rPr lang="en-US" dirty="0" smtClean="0">
+                <a:hlinkClick r:id="rId7"/>
+              </a:rPr>
+              <a:t>blogs.msdn.com/b/paolos/archive/2015/03/02/service-bus-explorer-2-6-now-available.aspx</a:t>
+            </a:r>
+            <a:endParaRPr lang="en-US" dirty="0" smtClean="0"/>
+          </a:p>
+        </p:txBody>
+      </p:sp>
+    </p:spTree>
+    <p:extLst>
+      <p:ext uri="{BB962C8B-B14F-4D97-AF65-F5344CB8AC3E}">
+        <p14:creationId xmlns:p14="http://schemas.microsoft.com/office/powerpoint/2010/main" val="1628994047"/>
+      </p:ext>
+    </p:extLst>
+  </p:cSld>
+  <p:clrMapOvr>
+    <a:masterClrMapping/>
+  </p:clrMapOvr>
 </p:sld>
 </file>
 
@@ -3718,7 +4208,7 @@
         </p:spPr>
         <p:txBody>
           <a:bodyPr>
-            <a:normAutofit fontScale="85000" lnSpcReduction="20000"/>
+            <a:normAutofit fontScale="77500" lnSpcReduction="20000"/>
           </a:bodyPr>
           <a:lstStyle/>
           <a:p>
@@ -3745,7 +4235,19 @@
             </a:r>
             <a:r>
               <a:rPr lang="en-US" dirty="0" smtClean="0"/>
-              <a:t> and Telemetry ingestion.  High throughput and processing flexibility is the main concern</a:t>
+              <a:t> and Telemetry ingestion.  </a:t>
+            </a:r>
+            <a:endParaRPr lang="en-US" dirty="0" smtClean="0"/>
+          </a:p>
+          <a:p>
+            <a:pPr lvl="1"/>
+            <a:r>
+              <a:rPr lang="en-US" dirty="0" smtClean="0"/>
+              <a:t>High </a:t>
+            </a:r>
+            <a:r>
+              <a:rPr lang="en-US" dirty="0" smtClean="0"/>
+              <a:t>throughput and processing flexibility is the main concern</a:t>
             </a:r>
           </a:p>
           <a:p>
@@ -4746,7 +5248,7 @@
           <a:p>
             <a:r>
               <a:rPr lang="en-US" dirty="0" smtClean="0"/>
-              <a:t>Event Hub – Sending Demo</a:t>
+              <a:t>Concepts - Checkpoints</a:t>
             </a:r>
             <a:endParaRPr lang="en-US" dirty="0"/>
           </a:p>
@@ -4764,10 +5266,77 @@
         </p:nvSpPr>
         <p:spPr/>
         <p:txBody>
-          <a:bodyPr/>
-          <a:lstStyle/>
-          <a:p>
-            <a:endParaRPr lang="en-US"/>
+          <a:bodyPr>
+            <a:normAutofit fontScale="85000" lnSpcReduction="20000"/>
+          </a:bodyPr>
+          <a:lstStyle/>
+          <a:p>
+            <a:r>
+              <a:rPr lang="en-US" dirty="0" smtClean="0"/>
+              <a:t>Checkpoints exist on each Event Hub, per Consumer Group, across all partitions</a:t>
+            </a:r>
+          </a:p>
+          <a:p>
+            <a:endParaRPr lang="en-US" dirty="0" smtClean="0"/>
+          </a:p>
+          <a:p>
+            <a:r>
+              <a:rPr lang="en-US" dirty="0" smtClean="0"/>
+              <a:t>Remember: </a:t>
+            </a:r>
+          </a:p>
+          <a:p>
+            <a:pPr lvl="1"/>
+            <a:r>
+              <a:rPr lang="en-US" dirty="0" smtClean="0"/>
+              <a:t>Each </a:t>
+            </a:r>
+            <a:r>
+              <a:rPr lang="en-US" dirty="0"/>
+              <a:t>consumer group is a “view” for an Event Hub</a:t>
+            </a:r>
+          </a:p>
+          <a:p>
+            <a:pPr lvl="2"/>
+            <a:r>
+              <a:rPr lang="en-US" dirty="0"/>
+              <a:t>State, Position and Offset</a:t>
+            </a:r>
+          </a:p>
+          <a:p>
+            <a:endParaRPr lang="en-US" dirty="0" smtClean="0"/>
+          </a:p>
+          <a:p>
+            <a:r>
+              <a:rPr lang="en-US" dirty="0" smtClean="0"/>
+              <a:t>Checkpoints persisting a reference point into our Consumer Group.  </a:t>
+            </a:r>
+            <a:r>
+              <a:rPr lang="en-US" sz="1600" dirty="0" smtClean="0"/>
+              <a:t>(Position, Offset)</a:t>
+            </a:r>
+            <a:endParaRPr lang="en-US" dirty="0" smtClean="0"/>
+          </a:p>
+          <a:p>
+            <a:endParaRPr lang="en-US" dirty="0" smtClean="0"/>
+          </a:p>
+          <a:p>
+            <a:r>
+              <a:rPr lang="en-US" dirty="0" smtClean="0"/>
+              <a:t>This avoids replaying the same messages</a:t>
+            </a:r>
+          </a:p>
+          <a:p>
+            <a:endParaRPr lang="en-US" dirty="0"/>
+          </a:p>
+          <a:p>
+            <a:r>
+              <a:rPr lang="en-US" dirty="0" smtClean="0"/>
+              <a:t>Checkpoints are NOT automatic.  You have to handle this yourself, depending on your own specific business requirements.</a:t>
+            </a:r>
+          </a:p>
+          <a:p>
+            <a:endParaRPr lang="en-US" dirty="0"/>
           </a:p>
         </p:txBody>
       </p:sp>

</xml_diff>

<commit_message>
final changes prior to presentation
</commit_message>
<xml_diff>
--- a/Massive scale with Azure Event Hubs for IoT.pptx
+++ b/Massive scale with Azure Event Hubs for IoT.pptx
@@ -15,12 +15,14 @@
     <p:sldId id="267" r:id="rId9"/>
     <p:sldId id="261" r:id="rId10"/>
     <p:sldId id="275" r:id="rId11"/>
-    <p:sldId id="274" r:id="rId12"/>
-    <p:sldId id="270" r:id="rId13"/>
-    <p:sldId id="262" r:id="rId14"/>
-    <p:sldId id="269" r:id="rId15"/>
-    <p:sldId id="271" r:id="rId16"/>
-    <p:sldId id="272" r:id="rId17"/>
+    <p:sldId id="277" r:id="rId12"/>
+    <p:sldId id="274" r:id="rId13"/>
+    <p:sldId id="270" r:id="rId14"/>
+    <p:sldId id="262" r:id="rId15"/>
+    <p:sldId id="269" r:id="rId16"/>
+    <p:sldId id="276" r:id="rId17"/>
+    <p:sldId id="271" r:id="rId18"/>
+    <p:sldId id="272" r:id="rId19"/>
   </p:sldIdLst>
   <p:sldSz cx="12192000" cy="6858000"/>
   <p:notesSz cx="6858000" cy="9144000"/>
@@ -3086,6 +3088,54 @@
           </a:p>
         </p:txBody>
       </p:sp>
+      <p:pic>
+        <p:nvPicPr>
+          <p:cNvPr id="1028" name="Picture 4" descr="web_logo.png (500×303)"/>
+          <p:cNvPicPr>
+            <a:picLocks noChangeAspect="1" noChangeArrowheads="1"/>
+          </p:cNvPicPr>
+          <p:nvPr/>
+        </p:nvPicPr>
+        <p:blipFill>
+          <a:blip r:embed="rId4" cstate="print">
+            <a:extLst>
+              <a:ext uri="{28A0092B-C50C-407E-A947-70E740481C1C}">
+                <a14:useLocalDpi xmlns:a14="http://schemas.microsoft.com/office/drawing/2010/main" val="0"/>
+              </a:ext>
+            </a:extLst>
+          </a:blip>
+          <a:srcRect/>
+          <a:stretch>
+            <a:fillRect/>
+          </a:stretch>
+        </p:blipFill>
+        <p:spPr bwMode="auto">
+          <a:xfrm>
+            <a:off x="10382491" y="5768083"/>
+            <a:ext cx="1495546" cy="906302"/>
+          </a:xfrm>
+          <a:prstGeom prst="rect">
+            <a:avLst/>
+          </a:prstGeom>
+          <a:noFill/>
+          <a:effectLst>
+            <a:innerShdw blurRad="63500" dist="50800" dir="13500000">
+              <a:prstClr val="black">
+                <a:alpha val="50000"/>
+              </a:prstClr>
+            </a:innerShdw>
+          </a:effectLst>
+          <a:extLst>
+            <a:ext uri="{909E8E84-426E-40DD-AFC4-6F175D3DCCD1}">
+              <a14:hiddenFill xmlns:a14="http://schemas.microsoft.com/office/drawing/2010/main">
+                <a:solidFill>
+                  <a:srgbClr val="FFFFFF"/>
+                </a:solidFill>
+              </a14:hiddenFill>
+            </a:ext>
+          </a:extLst>
+        </p:spPr>
+      </p:pic>
     </p:spTree>
     <p:extLst>
       <p:ext uri="{BB962C8B-B14F-4D97-AF65-F5344CB8AC3E}">
@@ -3293,7 +3343,7 @@
           <a:p>
             <a:r>
               <a:rPr lang="en-US" dirty="0" smtClean="0"/>
-              <a:t>Event Hub – Sending Demo</a:t>
+              <a:t>Concepts Summary</a:t>
             </a:r>
             <a:endParaRPr lang="en-US" dirty="0"/>
           </a:p>
@@ -3311,30 +3361,108 @@
         </p:nvSpPr>
         <p:spPr/>
         <p:txBody>
-          <a:bodyPr/>
-          <a:lstStyle/>
-          <a:p>
-            <a:endParaRPr lang="en-US"/>
+          <a:bodyPr>
+            <a:normAutofit fontScale="92500" lnSpcReduction="20000"/>
+          </a:bodyPr>
+          <a:lstStyle/>
+          <a:p>
+            <a:r>
+              <a:rPr lang="en-US" dirty="0" smtClean="0"/>
+              <a:t>Consumer Groups</a:t>
+            </a:r>
+          </a:p>
+          <a:p>
+            <a:pPr lvl="1"/>
+            <a:r>
+              <a:rPr lang="en-US" dirty="0" smtClean="0"/>
+              <a:t>Multiple “views” on an Event Hub</a:t>
+            </a:r>
+          </a:p>
+          <a:p>
+            <a:pPr lvl="1"/>
+            <a:endParaRPr lang="en-US" dirty="0" smtClean="0"/>
+          </a:p>
+          <a:p>
+            <a:r>
+              <a:rPr lang="en-US" dirty="0" smtClean="0"/>
+              <a:t>Partition Key</a:t>
+            </a:r>
+          </a:p>
+          <a:p>
+            <a:pPr lvl="1"/>
+            <a:r>
+              <a:rPr lang="en-US" dirty="0" smtClean="0"/>
+              <a:t>A way to shard your data into buckets, FIFO</a:t>
+            </a:r>
+          </a:p>
+          <a:p>
+            <a:pPr lvl="1"/>
+            <a:r>
+              <a:rPr lang="en-US" dirty="0" smtClean="0"/>
+              <a:t>Use something from your own domain.  Device Id, etc..</a:t>
+            </a:r>
+          </a:p>
+          <a:p>
+            <a:pPr lvl="1"/>
+            <a:endParaRPr lang="en-US" dirty="0" smtClean="0"/>
+          </a:p>
+          <a:p>
+            <a:r>
+              <a:rPr lang="en-US" dirty="0" smtClean="0"/>
+              <a:t>Partition Id</a:t>
+            </a:r>
+          </a:p>
+          <a:p>
+            <a:pPr lvl="1"/>
+            <a:r>
+              <a:rPr lang="en-US" dirty="0" smtClean="0"/>
+              <a:t>A number which represents the bucket</a:t>
+            </a:r>
+          </a:p>
+          <a:p>
+            <a:pPr lvl="1"/>
+            <a:endParaRPr lang="en-US" dirty="0" smtClean="0"/>
+          </a:p>
+          <a:p>
+            <a:r>
+              <a:rPr lang="en-US" dirty="0" smtClean="0"/>
+              <a:t>Checkpoints</a:t>
+            </a:r>
+          </a:p>
+          <a:p>
+            <a:pPr lvl="1"/>
+            <a:r>
+              <a:rPr lang="en-US" dirty="0" smtClean="0"/>
+              <a:t>To indicate that a set of messages have been processed</a:t>
+            </a:r>
+          </a:p>
+          <a:p>
+            <a:pPr lvl="1"/>
+            <a:r>
+              <a:rPr lang="en-US" dirty="0" smtClean="0"/>
+              <a:t>Avoids </a:t>
+            </a:r>
+            <a:r>
+              <a:rPr lang="en-US" dirty="0"/>
+              <a:t>replaying the same messages</a:t>
+            </a:r>
+            <a:endParaRPr lang="en-US" dirty="0" smtClean="0"/>
+          </a:p>
+          <a:p>
+            <a:endParaRPr lang="en-US" dirty="0"/>
           </a:p>
         </p:txBody>
       </p:sp>
     </p:spTree>
     <p:extLst>
       <p:ext uri="{BB962C8B-B14F-4D97-AF65-F5344CB8AC3E}">
-        <p14:creationId xmlns:p14="http://schemas.microsoft.com/office/powerpoint/2010/main" val="3584752711"/>
+        <p14:creationId xmlns:p14="http://schemas.microsoft.com/office/powerpoint/2010/main" val="437853474"/>
       </p:ext>
     </p:extLst>
   </p:cSld>
   <p:clrMapOvr>
     <a:masterClrMapping/>
   </p:clrMapOvr>
-  <p:timing>
-    <p:tnLst>
-      <p:par>
-        <p:cTn id="1" dur="indefinite" restart="never" nodeType="tmRoot"/>
-      </p:par>
-    </p:tnLst>
-  </p:timing>
 </p:sld>
 </file>
 
@@ -3372,7 +3500,7 @@
           <a:p>
             <a:r>
               <a:rPr lang="en-US" dirty="0" smtClean="0"/>
-              <a:t>Event Hub – Setting up to receive messages</a:t>
+              <a:t>Event Hub – Sending Demo</a:t>
             </a:r>
             <a:endParaRPr lang="en-US" dirty="0"/>
           </a:p>
@@ -3390,54 +3518,43 @@
         </p:nvSpPr>
         <p:spPr/>
         <p:txBody>
-          <a:bodyPr>
-            <a:normAutofit/>
-          </a:bodyPr>
-          <a:lstStyle/>
-          <a:p>
-            <a:r>
-              <a:rPr lang="en-US" dirty="0" smtClean="0"/>
-              <a:t>Need to create a Storage account for the client to manage Leases on our partitions</a:t>
-            </a:r>
-          </a:p>
-          <a:p>
-            <a:r>
-              <a:rPr lang="en-US" dirty="0" smtClean="0"/>
-              <a:t>The </a:t>
+          <a:bodyPr/>
+          <a:lstStyle/>
+          <a:p>
+            <a:r>
+              <a:rPr lang="en-US" dirty="0" smtClean="0"/>
+              <a:t>Native Client (AMQP or Http)</a:t>
+            </a:r>
+          </a:p>
+          <a:p>
+            <a:r>
+              <a:rPr lang="en-US" dirty="0" smtClean="0"/>
+              <a:t>Http Client (</a:t>
             </a:r>
             <a:r>
               <a:rPr lang="en-US" dirty="0" err="1" smtClean="0"/>
-              <a:t>EventHubProcessorHost</a:t>
-            </a:r>
-            <a:r>
-              <a:rPr lang="en-US" dirty="0" smtClean="0"/>
-              <a:t> is a high level abstraction above a basic Event Hub Consumer.  </a:t>
-            </a:r>
-          </a:p>
-          <a:p>
-            <a:pPr lvl="1"/>
-            <a:r>
-              <a:rPr lang="en-US" dirty="0" smtClean="0"/>
-              <a:t>It automatically manages which consumer (worker role) is connected to each partition on the Event Hub</a:t>
-            </a:r>
-          </a:p>
-          <a:p>
-            <a:pPr lvl="1"/>
+              <a:t>IoT</a:t>
+            </a:r>
+            <a:r>
+              <a:rPr lang="en-US" dirty="0" smtClean="0"/>
+              <a:t> Scenarios)</a:t>
+            </a:r>
+          </a:p>
+          <a:p>
             <a:endParaRPr lang="en-US" dirty="0" smtClean="0"/>
           </a:p>
           <a:p>
-            <a:pPr lvl="1"/>
-            <a:r>
-              <a:rPr lang="en-US" dirty="0" smtClean="0"/>
-              <a:t>It is needed in order to guarantee a single consumer per partition in our Event Hub</a:t>
-            </a:r>
+            <a:endParaRPr lang="en-US" dirty="0" smtClean="0"/>
+          </a:p>
+          <a:p>
+            <a:endParaRPr lang="en-US" dirty="0"/>
           </a:p>
         </p:txBody>
       </p:sp>
     </p:spTree>
     <p:extLst>
       <p:ext uri="{BB962C8B-B14F-4D97-AF65-F5344CB8AC3E}">
-        <p14:creationId xmlns:p14="http://schemas.microsoft.com/office/powerpoint/2010/main" val="4010707021"/>
+        <p14:creationId xmlns:p14="http://schemas.microsoft.com/office/powerpoint/2010/main" val="3584752711"/>
       </p:ext>
     </p:extLst>
   </p:cSld>
@@ -3488,7 +3605,7 @@
           <a:p>
             <a:r>
               <a:rPr lang="en-US" dirty="0" smtClean="0"/>
-              <a:t>Event Hub – Receiving Demo</a:t>
+              <a:t>Event Hub – Setting up to receive messages</a:t>
             </a:r>
             <a:endParaRPr lang="en-US" dirty="0"/>
           </a:p>
@@ -3506,39 +3623,61 @@
         </p:nvSpPr>
         <p:spPr/>
         <p:txBody>
-          <a:bodyPr/>
-          <a:lstStyle/>
-          <a:p>
-            <a:r>
-              <a:rPr lang="en-US" dirty="0" smtClean="0"/>
-              <a:t>Basic - consuming events</a:t>
-            </a:r>
-          </a:p>
-          <a:p>
-            <a:r>
-              <a:rPr lang="en-US" dirty="0" smtClean="0"/>
-              <a:t>Far better – consuming events with partitioning</a:t>
-            </a:r>
-          </a:p>
-          <a:p>
-            <a:r>
-              <a:rPr lang="en-US" dirty="0" smtClean="0"/>
-              <a:t>Bad – consuming </a:t>
-            </a:r>
-            <a:r>
-              <a:rPr lang="en-US" smtClean="0"/>
-              <a:t>events improperly</a:t>
+          <a:bodyPr>
+            <a:normAutofit/>
+          </a:bodyPr>
+          <a:lstStyle/>
+          <a:p>
+            <a:r>
+              <a:rPr lang="en-US" dirty="0" smtClean="0"/>
+              <a:t>Need to create a Storage account for the client to manage Leases on our </a:t>
+            </a:r>
+            <a:r>
+              <a:rPr lang="en-US" dirty="0" smtClean="0"/>
+              <a:t>partitions</a:t>
             </a:r>
           </a:p>
           <a:p>
             <a:endParaRPr lang="en-US" dirty="0" smtClean="0"/>
+          </a:p>
+          <a:p>
+            <a:r>
+              <a:rPr lang="en-US" dirty="0" smtClean="0"/>
+              <a:t>The </a:t>
+            </a:r>
+            <a:r>
+              <a:rPr lang="en-US" dirty="0" err="1" smtClean="0"/>
+              <a:t>EventHubProcessorHost</a:t>
+            </a:r>
+            <a:r>
+              <a:rPr lang="en-US" dirty="0" smtClean="0"/>
+              <a:t> is a high level abstraction above a basic Event Hub Consumer.  </a:t>
+            </a:r>
+          </a:p>
+          <a:p>
+            <a:pPr lvl="1"/>
+            <a:r>
+              <a:rPr lang="en-US" dirty="0" smtClean="0"/>
+              <a:t>It automatically manages which consumer (worker role) is connected to each partition on the Event Hub</a:t>
+            </a:r>
+          </a:p>
+          <a:p>
+            <a:pPr lvl="1"/>
+            <a:endParaRPr lang="en-US" dirty="0" smtClean="0"/>
+          </a:p>
+          <a:p>
+            <a:pPr lvl="1"/>
+            <a:r>
+              <a:rPr lang="en-US" dirty="0" smtClean="0"/>
+              <a:t>It is needed in order to guarantee a single consumer per partition in our Event Hub</a:t>
+            </a:r>
           </a:p>
         </p:txBody>
       </p:sp>
     </p:spTree>
     <p:extLst>
       <p:ext uri="{BB962C8B-B14F-4D97-AF65-F5344CB8AC3E}">
-        <p14:creationId xmlns:p14="http://schemas.microsoft.com/office/powerpoint/2010/main" val="1009225666"/>
+        <p14:creationId xmlns:p14="http://schemas.microsoft.com/office/powerpoint/2010/main" val="4010707021"/>
       </p:ext>
     </p:extLst>
   </p:cSld>
@@ -3589,40 +3728,75 @@
           <a:p>
             <a:r>
               <a:rPr lang="en-US" dirty="0" smtClean="0"/>
-              <a:t>Reference Architecture – Ingress Only</a:t>
+              <a:t>Event Hub – Receiving Demo</a:t>
             </a:r>
             <a:endParaRPr lang="en-US" dirty="0"/>
           </a:p>
         </p:txBody>
       </p:sp>
-      <p:pic>
-        <p:nvPicPr>
-          <p:cNvPr id="9" name="Picture 8"/>
-          <p:cNvPicPr>
-            <a:picLocks noChangeAspect="1"/>
-          </p:cNvPicPr>
-          <p:nvPr/>
-        </p:nvPicPr>
-        <p:blipFill>
-          <a:blip r:embed="rId2"/>
-          <a:stretch>
-            <a:fillRect/>
-          </a:stretch>
-        </p:blipFill>
-        <p:spPr>
-          <a:xfrm>
-            <a:off x="1296203" y="1518487"/>
-            <a:ext cx="8657143" cy="5257143"/>
-          </a:xfrm>
-          <a:prstGeom prst="rect">
-            <a:avLst/>
-          </a:prstGeom>
-        </p:spPr>
-      </p:pic>
+      <p:sp>
+        <p:nvSpPr>
+          <p:cNvPr id="3" name="Content Placeholder 2"/>
+          <p:cNvSpPr>
+            <a:spLocks noGrp="1"/>
+          </p:cNvSpPr>
+          <p:nvPr>
+            <p:ph idx="1"/>
+          </p:nvPr>
+        </p:nvSpPr>
+        <p:spPr/>
+        <p:txBody>
+          <a:bodyPr/>
+          <a:lstStyle/>
+          <a:p>
+            <a:endParaRPr lang="en-US" dirty="0" smtClean="0"/>
+          </a:p>
+          <a:p>
+            <a:r>
+              <a:rPr lang="en-US" dirty="0" smtClean="0"/>
+              <a:t>Service Bus Explorer</a:t>
+            </a:r>
+          </a:p>
+          <a:p>
+            <a:endParaRPr lang="en-US" dirty="0" smtClean="0"/>
+          </a:p>
+          <a:p>
+            <a:r>
+              <a:rPr lang="en-US" dirty="0" smtClean="0"/>
+              <a:t>Code Samples…</a:t>
+            </a:r>
+            <a:endParaRPr lang="en-US" dirty="0"/>
+          </a:p>
+          <a:p>
+            <a:pPr lvl="1"/>
+            <a:r>
+              <a:rPr lang="en-US" dirty="0" smtClean="0"/>
+              <a:t>Basic - consuming events</a:t>
+            </a:r>
+          </a:p>
+          <a:p>
+            <a:pPr lvl="1"/>
+            <a:r>
+              <a:rPr lang="en-US" dirty="0"/>
+              <a:t>Bad – consuming events improperly</a:t>
+            </a:r>
+          </a:p>
+          <a:p>
+            <a:pPr lvl="1"/>
+            <a:r>
+              <a:rPr lang="en-US" dirty="0" smtClean="0"/>
+              <a:t>Better – consuming events with partitioning</a:t>
+            </a:r>
+          </a:p>
+          <a:p>
+            <a:endParaRPr lang="en-US" dirty="0" smtClean="0"/>
+          </a:p>
+        </p:txBody>
+      </p:sp>
     </p:spTree>
     <p:extLst>
       <p:ext uri="{BB962C8B-B14F-4D97-AF65-F5344CB8AC3E}">
-        <p14:creationId xmlns:p14="http://schemas.microsoft.com/office/powerpoint/2010/main" val="993413567"/>
+        <p14:creationId xmlns:p14="http://schemas.microsoft.com/office/powerpoint/2010/main" val="1009225666"/>
       </p:ext>
     </p:extLst>
   </p:cSld>
@@ -3673,66 +3847,40 @@
           <a:p>
             <a:r>
               <a:rPr lang="en-US" dirty="0" smtClean="0"/>
-              <a:t>Hot vs Cold Path</a:t>
+              <a:t>Reference Architecture – Ingress Only</a:t>
             </a:r>
             <a:endParaRPr lang="en-US" dirty="0"/>
           </a:p>
         </p:txBody>
       </p:sp>
-      <p:sp>
-        <p:nvSpPr>
-          <p:cNvPr id="3" name="Content Placeholder 2"/>
-          <p:cNvSpPr>
-            <a:spLocks noGrp="1"/>
-          </p:cNvSpPr>
-          <p:nvPr>
-            <p:ph idx="1"/>
-          </p:nvPr>
-        </p:nvSpPr>
-        <p:spPr/>
-        <p:txBody>
-          <a:bodyPr/>
-          <a:lstStyle/>
-          <a:p>
-            <a:r>
-              <a:rPr lang="en-US" dirty="0" smtClean="0"/>
-              <a:t>Make sure you optimize the Hot path.  </a:t>
-            </a:r>
-          </a:p>
-          <a:p>
-            <a:endParaRPr lang="en-US" dirty="0" smtClean="0"/>
-          </a:p>
-          <a:p>
-            <a:r>
-              <a:rPr lang="en-US" dirty="0" smtClean="0"/>
-              <a:t>Focus on what is important between the device and the consumer</a:t>
-            </a:r>
-          </a:p>
-          <a:p>
-            <a:endParaRPr lang="en-US" dirty="0" smtClean="0"/>
-          </a:p>
-          <a:p>
-            <a:r>
-              <a:rPr lang="en-US" dirty="0" smtClean="0"/>
-              <a:t>Use streaming analytics for persistence</a:t>
-            </a:r>
-          </a:p>
-          <a:p>
-            <a:endParaRPr lang="en-US" dirty="0"/>
-          </a:p>
-          <a:p>
-            <a:r>
-              <a:rPr lang="en-US" dirty="0" smtClean="0"/>
-              <a:t>Its better to NOT use any of your custom worker roles in the Hot Path, minimize it as much as you can.</a:t>
-            </a:r>
-            <a:endParaRPr lang="en-US" dirty="0"/>
-          </a:p>
-        </p:txBody>
-      </p:sp>
+      <p:pic>
+        <p:nvPicPr>
+          <p:cNvPr id="9" name="Picture 8"/>
+          <p:cNvPicPr>
+            <a:picLocks noChangeAspect="1"/>
+          </p:cNvPicPr>
+          <p:nvPr/>
+        </p:nvPicPr>
+        <p:blipFill>
+          <a:blip r:embed="rId2"/>
+          <a:stretch>
+            <a:fillRect/>
+          </a:stretch>
+        </p:blipFill>
+        <p:spPr>
+          <a:xfrm>
+            <a:off x="1984090" y="1437938"/>
+            <a:ext cx="7774461" cy="4721125"/>
+          </a:xfrm>
+          <a:prstGeom prst="rect">
+            <a:avLst/>
+          </a:prstGeom>
+        </p:spPr>
+      </p:pic>
     </p:spTree>
     <p:extLst>
       <p:ext uri="{BB962C8B-B14F-4D97-AF65-F5344CB8AC3E}">
-        <p14:creationId xmlns:p14="http://schemas.microsoft.com/office/powerpoint/2010/main" val="1827489379"/>
+        <p14:creationId xmlns:p14="http://schemas.microsoft.com/office/powerpoint/2010/main" val="993413567"/>
       </p:ext>
     </p:extLst>
   </p:cSld>
@@ -3778,6 +3926,212 @@
         </p:nvSpPr>
         <p:spPr/>
         <p:txBody>
+          <a:bodyPr>
+            <a:normAutofit/>
+          </a:bodyPr>
+          <a:lstStyle/>
+          <a:p>
+            <a:r>
+              <a:rPr lang="en-US" sz="4000" dirty="0" smtClean="0"/>
+              <a:t>Reference Architecture – </a:t>
+            </a:r>
+            <a:r>
+              <a:rPr lang="en-US" sz="4000" dirty="0" smtClean="0"/>
+              <a:t>Command and Control</a:t>
+            </a:r>
+            <a:endParaRPr lang="en-US" sz="4000" dirty="0"/>
+          </a:p>
+        </p:txBody>
+      </p:sp>
+      <p:pic>
+        <p:nvPicPr>
+          <p:cNvPr id="4" name="Picture 3"/>
+          <p:cNvPicPr>
+            <a:picLocks noChangeAspect="1"/>
+          </p:cNvPicPr>
+          <p:nvPr/>
+        </p:nvPicPr>
+        <p:blipFill>
+          <a:blip r:embed="rId2">
+            <a:extLst>
+              <a:ext uri="{28A0092B-C50C-407E-A947-70E740481C1C}">
+                <a14:useLocalDpi xmlns:a14="http://schemas.microsoft.com/office/drawing/2010/main" val="0"/>
+              </a:ext>
+            </a:extLst>
+          </a:blip>
+          <a:stretch>
+            <a:fillRect/>
+          </a:stretch>
+        </p:blipFill>
+        <p:spPr>
+          <a:xfrm>
+            <a:off x="2325188" y="1366030"/>
+            <a:ext cx="6844938" cy="5248539"/>
+          </a:xfrm>
+          <a:prstGeom prst="rect">
+            <a:avLst/>
+          </a:prstGeom>
+        </p:spPr>
+      </p:pic>
+    </p:spTree>
+    <p:extLst>
+      <p:ext uri="{BB962C8B-B14F-4D97-AF65-F5344CB8AC3E}">
+        <p14:creationId xmlns:p14="http://schemas.microsoft.com/office/powerpoint/2010/main" val="1192438248"/>
+      </p:ext>
+    </p:extLst>
+  </p:cSld>
+  <p:clrMapOvr>
+    <a:masterClrMapping/>
+  </p:clrMapOvr>
+  <p:timing>
+    <p:tnLst>
+      <p:par>
+        <p:cTn id="1" dur="indefinite" restart="never" nodeType="tmRoot"/>
+      </p:par>
+    </p:tnLst>
+  </p:timing>
+</p:sld>
+</file>
+
+<file path=ppt/slides/slide17.xml><?xml version="1.0" encoding="utf-8"?>
+<p:sld xmlns:a="http://schemas.openxmlformats.org/drawingml/2006/main" xmlns:r="http://schemas.openxmlformats.org/officeDocument/2006/relationships" xmlns:p="http://schemas.openxmlformats.org/presentationml/2006/main">
+  <p:cSld>
+    <p:spTree>
+      <p:nvGrpSpPr>
+        <p:cNvPr id="1" name=""/>
+        <p:cNvGrpSpPr/>
+        <p:nvPr/>
+      </p:nvGrpSpPr>
+      <p:grpSpPr>
+        <a:xfrm>
+          <a:off x="0" y="0"/>
+          <a:ext cx="0" cy="0"/>
+          <a:chOff x="0" y="0"/>
+          <a:chExt cx="0" cy="0"/>
+        </a:xfrm>
+      </p:grpSpPr>
+      <p:sp>
+        <p:nvSpPr>
+          <p:cNvPr id="2" name="Title 1"/>
+          <p:cNvSpPr>
+            <a:spLocks noGrp="1"/>
+          </p:cNvSpPr>
+          <p:nvPr>
+            <p:ph type="title"/>
+          </p:nvPr>
+        </p:nvSpPr>
+        <p:spPr/>
+        <p:txBody>
+          <a:bodyPr/>
+          <a:lstStyle/>
+          <a:p>
+            <a:r>
+              <a:rPr lang="en-US" dirty="0" smtClean="0"/>
+              <a:t>Hot vs Cold Path</a:t>
+            </a:r>
+            <a:endParaRPr lang="en-US" dirty="0"/>
+          </a:p>
+        </p:txBody>
+      </p:sp>
+      <p:sp>
+        <p:nvSpPr>
+          <p:cNvPr id="3" name="Content Placeholder 2"/>
+          <p:cNvSpPr>
+            <a:spLocks noGrp="1"/>
+          </p:cNvSpPr>
+          <p:nvPr>
+            <p:ph idx="1"/>
+          </p:nvPr>
+        </p:nvSpPr>
+        <p:spPr/>
+        <p:txBody>
+          <a:bodyPr/>
+          <a:lstStyle/>
+          <a:p>
+            <a:r>
+              <a:rPr lang="en-US" dirty="0" smtClean="0"/>
+              <a:t>Make sure you optimize the Hot path.  </a:t>
+            </a:r>
+          </a:p>
+          <a:p>
+            <a:endParaRPr lang="en-US" dirty="0" smtClean="0"/>
+          </a:p>
+          <a:p>
+            <a:r>
+              <a:rPr lang="en-US" dirty="0" smtClean="0"/>
+              <a:t>Focus on what is important between the device and the consumer</a:t>
+            </a:r>
+          </a:p>
+          <a:p>
+            <a:endParaRPr lang="en-US" dirty="0" smtClean="0"/>
+          </a:p>
+          <a:p>
+            <a:r>
+              <a:rPr lang="en-US" dirty="0" smtClean="0"/>
+              <a:t>Use streaming analytics for persistence</a:t>
+            </a:r>
+          </a:p>
+          <a:p>
+            <a:endParaRPr lang="en-US" dirty="0"/>
+          </a:p>
+          <a:p>
+            <a:r>
+              <a:rPr lang="en-US" dirty="0" smtClean="0"/>
+              <a:t>Its better to NOT use any of your custom worker roles in the Hot Path, minimize it as much as you can.</a:t>
+            </a:r>
+            <a:endParaRPr lang="en-US" dirty="0"/>
+          </a:p>
+        </p:txBody>
+      </p:sp>
+    </p:spTree>
+    <p:extLst>
+      <p:ext uri="{BB962C8B-B14F-4D97-AF65-F5344CB8AC3E}">
+        <p14:creationId xmlns:p14="http://schemas.microsoft.com/office/powerpoint/2010/main" val="1827489379"/>
+      </p:ext>
+    </p:extLst>
+  </p:cSld>
+  <p:clrMapOvr>
+    <a:masterClrMapping/>
+  </p:clrMapOvr>
+  <p:timing>
+    <p:tnLst>
+      <p:par>
+        <p:cTn id="1" dur="indefinite" restart="never" nodeType="tmRoot"/>
+      </p:par>
+    </p:tnLst>
+  </p:timing>
+</p:sld>
+</file>
+
+<file path=ppt/slides/slide18.xml><?xml version="1.0" encoding="utf-8"?>
+<p:sld xmlns:a="http://schemas.openxmlformats.org/drawingml/2006/main" xmlns:r="http://schemas.openxmlformats.org/officeDocument/2006/relationships" xmlns:p="http://schemas.openxmlformats.org/presentationml/2006/main">
+  <p:cSld>
+    <p:spTree>
+      <p:nvGrpSpPr>
+        <p:cNvPr id="1" name=""/>
+        <p:cNvGrpSpPr/>
+        <p:nvPr/>
+      </p:nvGrpSpPr>
+      <p:grpSpPr>
+        <a:xfrm>
+          <a:off x="0" y="0"/>
+          <a:ext cx="0" cy="0"/>
+          <a:chOff x="0" y="0"/>
+          <a:chExt cx="0" cy="0"/>
+        </a:xfrm>
+      </p:grpSpPr>
+      <p:sp>
+        <p:nvSpPr>
+          <p:cNvPr id="2" name="Title 1"/>
+          <p:cNvSpPr>
+            <a:spLocks noGrp="1"/>
+          </p:cNvSpPr>
+          <p:nvPr>
+            <p:ph type="title"/>
+          </p:nvPr>
+        </p:nvSpPr>
+        <p:spPr/>
+        <p:txBody>
           <a:bodyPr/>
           <a:lstStyle/>
           <a:p>
@@ -4032,10 +4386,15 @@
             <p:ph idx="1"/>
           </p:nvPr>
         </p:nvSpPr>
-        <p:spPr/>
+        <p:spPr>
+          <a:xfrm>
+            <a:off x="302172" y="1832960"/>
+            <a:ext cx="5920946" cy="4351338"/>
+          </a:xfrm>
+        </p:spPr>
         <p:txBody>
           <a:bodyPr>
-            <a:normAutofit fontScale="55000" lnSpcReduction="20000"/>
+            <a:normAutofit fontScale="92500" lnSpcReduction="20000"/>
           </a:bodyPr>
           <a:lstStyle/>
           <a:p>
@@ -4079,10 +4438,197 @@
           <a:p>
             <a:endParaRPr lang="en-US" dirty="0" smtClean="0"/>
           </a:p>
-          <a:p>
-            <a:r>
-              <a:rPr lang="en-US" dirty="0" smtClean="0"/>
-              <a:t>They are CPU Bound, so can be scaled with ease</a:t>
+        </p:txBody>
+      </p:sp>
+      <p:sp>
+        <p:nvSpPr>
+          <p:cNvPr id="4" name="Content Placeholder 2"/>
+          <p:cNvSpPr txBox="1">
+            <a:spLocks/>
+          </p:cNvSpPr>
+          <p:nvPr/>
+        </p:nvSpPr>
+        <p:spPr>
+          <a:xfrm>
+            <a:off x="6096000" y="1832960"/>
+            <a:ext cx="5920946" cy="4351338"/>
+          </a:xfrm>
+          <a:prstGeom prst="rect">
+            <a:avLst/>
+          </a:prstGeom>
+        </p:spPr>
+        <p:txBody>
+          <a:bodyPr vert="horz" lIns="91440" tIns="45720" rIns="91440" bIns="45720" rtlCol="0">
+            <a:normAutofit lnSpcReduction="10000"/>
+          </a:bodyPr>
+          <a:lstStyle>
+            <a:lvl1pPr marL="228600" indent="-228600" algn="l" defTabSz="914400" rtl="0" eaLnBrk="1" latinLnBrk="0" hangingPunct="1">
+              <a:lnSpc>
+                <a:spcPct val="90000"/>
+              </a:lnSpc>
+              <a:spcBef>
+                <a:spcPts val="1000"/>
+              </a:spcBef>
+              <a:buFont typeface="Arial" panose="020B0604020202020204" pitchFamily="34" charset="0"/>
+              <a:buChar char="•"/>
+              <a:defRPr sz="2800" kern="1200">
+                <a:solidFill>
+                  <a:schemeClr val="tx1"/>
+                </a:solidFill>
+                <a:latin typeface="+mn-lt"/>
+                <a:ea typeface="+mn-ea"/>
+                <a:cs typeface="+mn-cs"/>
+              </a:defRPr>
+            </a:lvl1pPr>
+            <a:lvl2pPr marL="685800" indent="-228600" algn="l" defTabSz="914400" rtl="0" eaLnBrk="1" latinLnBrk="0" hangingPunct="1">
+              <a:lnSpc>
+                <a:spcPct val="90000"/>
+              </a:lnSpc>
+              <a:spcBef>
+                <a:spcPts val="500"/>
+              </a:spcBef>
+              <a:buFont typeface="Arial" panose="020B0604020202020204" pitchFamily="34" charset="0"/>
+              <a:buChar char="•"/>
+              <a:defRPr sz="2400" kern="1200">
+                <a:solidFill>
+                  <a:schemeClr val="tx1"/>
+                </a:solidFill>
+                <a:latin typeface="+mn-lt"/>
+                <a:ea typeface="+mn-ea"/>
+                <a:cs typeface="+mn-cs"/>
+              </a:defRPr>
+            </a:lvl2pPr>
+            <a:lvl3pPr marL="1143000" indent="-228600" algn="l" defTabSz="914400" rtl="0" eaLnBrk="1" latinLnBrk="0" hangingPunct="1">
+              <a:lnSpc>
+                <a:spcPct val="90000"/>
+              </a:lnSpc>
+              <a:spcBef>
+                <a:spcPts val="500"/>
+              </a:spcBef>
+              <a:buFont typeface="Arial" panose="020B0604020202020204" pitchFamily="34" charset="0"/>
+              <a:buChar char="•"/>
+              <a:defRPr sz="2000" kern="1200">
+                <a:solidFill>
+                  <a:schemeClr val="tx1"/>
+                </a:solidFill>
+                <a:latin typeface="+mn-lt"/>
+                <a:ea typeface="+mn-ea"/>
+                <a:cs typeface="+mn-cs"/>
+              </a:defRPr>
+            </a:lvl3pPr>
+            <a:lvl4pPr marL="1600200" indent="-228600" algn="l" defTabSz="914400" rtl="0" eaLnBrk="1" latinLnBrk="0" hangingPunct="1">
+              <a:lnSpc>
+                <a:spcPct val="90000"/>
+              </a:lnSpc>
+              <a:spcBef>
+                <a:spcPts val="500"/>
+              </a:spcBef>
+              <a:buFont typeface="Arial" panose="020B0604020202020204" pitchFamily="34" charset="0"/>
+              <a:buChar char="•"/>
+              <a:defRPr sz="1800" kern="1200">
+                <a:solidFill>
+                  <a:schemeClr val="tx1"/>
+                </a:solidFill>
+                <a:latin typeface="+mn-lt"/>
+                <a:ea typeface="+mn-ea"/>
+                <a:cs typeface="+mn-cs"/>
+              </a:defRPr>
+            </a:lvl4pPr>
+            <a:lvl5pPr marL="2057400" indent="-228600" algn="l" defTabSz="914400" rtl="0" eaLnBrk="1" latinLnBrk="0" hangingPunct="1">
+              <a:lnSpc>
+                <a:spcPct val="90000"/>
+              </a:lnSpc>
+              <a:spcBef>
+                <a:spcPts val="500"/>
+              </a:spcBef>
+              <a:buFont typeface="Arial" panose="020B0604020202020204" pitchFamily="34" charset="0"/>
+              <a:buChar char="•"/>
+              <a:defRPr sz="1800" kern="1200">
+                <a:solidFill>
+                  <a:schemeClr val="tx1"/>
+                </a:solidFill>
+                <a:latin typeface="+mn-lt"/>
+                <a:ea typeface="+mn-ea"/>
+                <a:cs typeface="+mn-cs"/>
+              </a:defRPr>
+            </a:lvl5pPr>
+            <a:lvl6pPr marL="2514600" indent="-228600" algn="l" defTabSz="914400" rtl="0" eaLnBrk="1" latinLnBrk="0" hangingPunct="1">
+              <a:lnSpc>
+                <a:spcPct val="90000"/>
+              </a:lnSpc>
+              <a:spcBef>
+                <a:spcPts val="500"/>
+              </a:spcBef>
+              <a:buFont typeface="Arial" panose="020B0604020202020204" pitchFamily="34" charset="0"/>
+              <a:buChar char="•"/>
+              <a:defRPr sz="1800" kern="1200">
+                <a:solidFill>
+                  <a:schemeClr val="tx1"/>
+                </a:solidFill>
+                <a:latin typeface="+mn-lt"/>
+                <a:ea typeface="+mn-ea"/>
+                <a:cs typeface="+mn-cs"/>
+              </a:defRPr>
+            </a:lvl6pPr>
+            <a:lvl7pPr marL="2971800" indent="-228600" algn="l" defTabSz="914400" rtl="0" eaLnBrk="1" latinLnBrk="0" hangingPunct="1">
+              <a:lnSpc>
+                <a:spcPct val="90000"/>
+              </a:lnSpc>
+              <a:spcBef>
+                <a:spcPts val="500"/>
+              </a:spcBef>
+              <a:buFont typeface="Arial" panose="020B0604020202020204" pitchFamily="34" charset="0"/>
+              <a:buChar char="•"/>
+              <a:defRPr sz="1800" kern="1200">
+                <a:solidFill>
+                  <a:schemeClr val="tx1"/>
+                </a:solidFill>
+                <a:latin typeface="+mn-lt"/>
+                <a:ea typeface="+mn-ea"/>
+                <a:cs typeface="+mn-cs"/>
+              </a:defRPr>
+            </a:lvl7pPr>
+            <a:lvl8pPr marL="3429000" indent="-228600" algn="l" defTabSz="914400" rtl="0" eaLnBrk="1" latinLnBrk="0" hangingPunct="1">
+              <a:lnSpc>
+                <a:spcPct val="90000"/>
+              </a:lnSpc>
+              <a:spcBef>
+                <a:spcPts val="500"/>
+              </a:spcBef>
+              <a:buFont typeface="Arial" panose="020B0604020202020204" pitchFamily="34" charset="0"/>
+              <a:buChar char="•"/>
+              <a:defRPr sz="1800" kern="1200">
+                <a:solidFill>
+                  <a:schemeClr val="tx1"/>
+                </a:solidFill>
+                <a:latin typeface="+mn-lt"/>
+                <a:ea typeface="+mn-ea"/>
+                <a:cs typeface="+mn-cs"/>
+              </a:defRPr>
+            </a:lvl8pPr>
+            <a:lvl9pPr marL="3886200" indent="-228600" algn="l" defTabSz="914400" rtl="0" eaLnBrk="1" latinLnBrk="0" hangingPunct="1">
+              <a:lnSpc>
+                <a:spcPct val="90000"/>
+              </a:lnSpc>
+              <a:spcBef>
+                <a:spcPts val="500"/>
+              </a:spcBef>
+              <a:buFont typeface="Arial" panose="020B0604020202020204" pitchFamily="34" charset="0"/>
+              <a:buChar char="•"/>
+              <a:defRPr sz="1800" kern="1200">
+                <a:solidFill>
+                  <a:schemeClr val="tx1"/>
+                </a:solidFill>
+                <a:latin typeface="+mn-lt"/>
+                <a:ea typeface="+mn-ea"/>
+                <a:cs typeface="+mn-cs"/>
+              </a:defRPr>
+            </a:lvl9pPr>
+          </a:lstStyle>
+          <a:p>
+            <a:r>
+              <a:rPr lang="en-US" dirty="0" smtClean="0"/>
+              <a:t>Consumers are CPU Bound, so can be scaled with ease</a:t>
             </a:r>
           </a:p>
           <a:p>
@@ -4214,7 +4760,15 @@
           <a:p>
             <a:r>
               <a:rPr lang="en-US" dirty="0" smtClean="0"/>
-              <a:t>Don’t use ancient alien tech...</a:t>
+              <a:t>Don’t use </a:t>
+            </a:r>
+            <a:r>
+              <a:rPr lang="en-US" dirty="0" smtClean="0"/>
+              <a:t>alien </a:t>
+            </a:r>
+            <a:r>
+              <a:rPr lang="en-US" dirty="0" smtClean="0"/>
+              <a:t>tech...</a:t>
             </a:r>
           </a:p>
           <a:p>
@@ -4259,12 +4813,20 @@
               <a:t>We </a:t>
             </a:r>
             <a:r>
-              <a:rPr lang="en-US" dirty="0" err="1" smtClean="0"/>
-              <a:t>dont</a:t>
-            </a:r>
-            <a:r>
-              <a:rPr lang="en-US" dirty="0" smtClean="0"/>
-              <a:t> need sequencing, dead-lettering, transactions, strong delivery assurances that come with Queues</a:t>
+              <a:rPr lang="en-US" dirty="0" smtClean="0"/>
+              <a:t>don’t </a:t>
+            </a:r>
+            <a:r>
+              <a:rPr lang="en-US" dirty="0" smtClean="0"/>
+              <a:t>need sequencing, dead-lettering, transactions, </a:t>
+            </a:r>
+            <a:r>
+              <a:rPr lang="en-US" dirty="0" smtClean="0"/>
+              <a:t>nor strong </a:t>
+            </a:r>
+            <a:r>
+              <a:rPr lang="en-US" dirty="0" smtClean="0"/>
+              <a:t>delivery assurances that come with Queues</a:t>
             </a:r>
           </a:p>
           <a:p>
@@ -4762,7 +5324,7 @@
         <p:spPr/>
         <p:txBody>
           <a:bodyPr>
-            <a:normAutofit fontScale="92500" lnSpcReduction="10000"/>
+            <a:normAutofit fontScale="85000" lnSpcReduction="20000"/>
           </a:bodyPr>
           <a:lstStyle/>
           <a:p>
@@ -4867,10 +5429,22 @@
             <a:pPr lvl="1"/>
             <a:r>
               <a:rPr lang="en-US" dirty="0" smtClean="0"/>
-              <a:t>Recommended, if your scenario calls for it</a:t>
-            </a:r>
-          </a:p>
-          <a:p>
+              <a:t>Recommended, if your scenario calls for </a:t>
+            </a:r>
+            <a:r>
+              <a:rPr lang="en-US" dirty="0" smtClean="0"/>
+              <a:t>it</a:t>
+            </a:r>
+          </a:p>
+          <a:p>
+            <a:pPr lvl="1"/>
+            <a:endParaRPr lang="en-US" dirty="0" smtClean="0"/>
+          </a:p>
+          <a:p>
+            <a:r>
+              <a:rPr lang="en-US" dirty="0" smtClean="0"/>
+              <a:t>Its just a string</a:t>
+            </a:r>
             <a:endParaRPr lang="en-US" dirty="0"/>
           </a:p>
         </p:txBody>

</xml_diff>